<commit_message>
update DAY8 ML4HPC slides
</commit_message>
<xml_diff>
--- a/DAY8/ML4HPC/slides/Magurele_3.pptx
+++ b/DAY8/ML4HPC/slides/Magurele_3.pptx
@@ -21,9 +21,12 @@
     <p:sldId id="271" r:id="rId15"/>
     <p:sldId id="272" r:id="rId16"/>
     <p:sldId id="273" r:id="rId17"/>
-    <p:sldId id="274" r:id="rId18"/>
-    <p:sldId id="276" r:id="rId19"/>
-    <p:sldId id="275" r:id="rId20"/>
+    <p:sldId id="277" r:id="rId18"/>
+    <p:sldId id="278" r:id="rId19"/>
+    <p:sldId id="279" r:id="rId20"/>
+    <p:sldId id="274" r:id="rId21"/>
+    <p:sldId id="276" r:id="rId22"/>
+    <p:sldId id="275" r:id="rId23"/>
   </p:sldIdLst>
   <p:sldSz cx="12192000" cy="6858000"/>
   <p:notesSz cx="6858000" cy="9144000"/>
@@ -133,8 +136,7 @@
 <file path=ppt/revisionInfo.xml><?xml version="1.0" encoding="utf-8"?>
 <p1510:revInfo xmlns:a="http://schemas.openxmlformats.org/drawingml/2006/main" xmlns:r="http://schemas.openxmlformats.org/officeDocument/2006/relationships" xmlns:p1510="http://schemas.microsoft.com/office/powerpoint/2015/10/main">
   <p1510:revLst>
-    <p1510:client id="{6DD965FE-116D-591C-1737-57521268E9CF}" v="276" dt="2025-07-04T00:30:56.717"/>
-    <p1510:client id="{AA467009-4335-E15A-ADDC-102EA5645565}" v="1964" dt="2025-07-05T14:22:38.236"/>
+    <p1510:client id="{AA467009-4335-E15A-ADDC-102EA5645565}" v="2424" dt="2025-07-07T04:44:20.805"/>
   </p1510:revLst>
 </p1510:revInfo>
 </file>
@@ -270,7 +272,7 @@
           <a:p>
             <a:fld id="{846CE7D5-CF57-46EF-B807-FDD0502418D4}" type="datetimeFigureOut">
               <a:rPr lang="en-US" smtClean="0"/>
-              <a:t>7/5/2025</a:t>
+              <a:t>7/6/2025</a:t>
             </a:fld>
             <a:endParaRPr lang="en-US"/>
           </a:p>
@@ -440,7 +442,7 @@
           <a:p>
             <a:fld id="{846CE7D5-CF57-46EF-B807-FDD0502418D4}" type="datetimeFigureOut">
               <a:rPr lang="en-US" smtClean="0"/>
-              <a:t>7/5/2025</a:t>
+              <a:t>7/6/2025</a:t>
             </a:fld>
             <a:endParaRPr lang="en-US"/>
           </a:p>
@@ -620,7 +622,7 @@
           <a:p>
             <a:fld id="{846CE7D5-CF57-46EF-B807-FDD0502418D4}" type="datetimeFigureOut">
               <a:rPr lang="en-US" smtClean="0"/>
-              <a:t>7/5/2025</a:t>
+              <a:t>7/6/2025</a:t>
             </a:fld>
             <a:endParaRPr lang="en-US"/>
           </a:p>
@@ -790,7 +792,7 @@
           <a:p>
             <a:fld id="{846CE7D5-CF57-46EF-B807-FDD0502418D4}" type="datetimeFigureOut">
               <a:rPr lang="en-US" smtClean="0"/>
-              <a:t>7/5/2025</a:t>
+              <a:t>7/6/2025</a:t>
             </a:fld>
             <a:endParaRPr lang="en-US"/>
           </a:p>
@@ -1036,7 +1038,7 @@
           <a:p>
             <a:fld id="{846CE7D5-CF57-46EF-B807-FDD0502418D4}" type="datetimeFigureOut">
               <a:rPr lang="en-US" smtClean="0"/>
-              <a:t>7/5/2025</a:t>
+              <a:t>7/6/2025</a:t>
             </a:fld>
             <a:endParaRPr lang="en-US"/>
           </a:p>
@@ -1268,7 +1270,7 @@
           <a:p>
             <a:fld id="{846CE7D5-CF57-46EF-B807-FDD0502418D4}" type="datetimeFigureOut">
               <a:rPr lang="en-US" smtClean="0"/>
-              <a:t>7/5/2025</a:t>
+              <a:t>7/6/2025</a:t>
             </a:fld>
             <a:endParaRPr lang="en-US"/>
           </a:p>
@@ -1635,7 +1637,7 @@
           <a:p>
             <a:fld id="{846CE7D5-CF57-46EF-B807-FDD0502418D4}" type="datetimeFigureOut">
               <a:rPr lang="en-US" smtClean="0"/>
-              <a:t>7/5/2025</a:t>
+              <a:t>7/6/2025</a:t>
             </a:fld>
             <a:endParaRPr lang="en-US"/>
           </a:p>
@@ -1753,7 +1755,7 @@
           <a:p>
             <a:fld id="{846CE7D5-CF57-46EF-B807-FDD0502418D4}" type="datetimeFigureOut">
               <a:rPr lang="en-US" smtClean="0"/>
-              <a:t>7/5/2025</a:t>
+              <a:t>7/6/2025</a:t>
             </a:fld>
             <a:endParaRPr lang="en-US"/>
           </a:p>
@@ -1848,7 +1850,7 @@
           <a:p>
             <a:fld id="{846CE7D5-CF57-46EF-B807-FDD0502418D4}" type="datetimeFigureOut">
               <a:rPr lang="en-US" smtClean="0"/>
-              <a:t>7/5/2025</a:t>
+              <a:t>7/6/2025</a:t>
             </a:fld>
             <a:endParaRPr lang="en-US"/>
           </a:p>
@@ -2125,7 +2127,7 @@
           <a:p>
             <a:fld id="{846CE7D5-CF57-46EF-B807-FDD0502418D4}" type="datetimeFigureOut">
               <a:rPr lang="en-US" smtClean="0"/>
-              <a:t>7/5/2025</a:t>
+              <a:t>7/6/2025</a:t>
             </a:fld>
             <a:endParaRPr lang="en-US"/>
           </a:p>
@@ -2382,7 +2384,7 @@
           <a:p>
             <a:fld id="{846CE7D5-CF57-46EF-B807-FDD0502418D4}" type="datetimeFigureOut">
               <a:rPr lang="en-US" smtClean="0"/>
-              <a:t>7/5/2025</a:t>
+              <a:t>7/6/2025</a:t>
             </a:fld>
             <a:endParaRPr lang="en-US"/>
           </a:p>
@@ -2595,7 +2597,7 @@
           <a:p>
             <a:fld id="{846CE7D5-CF57-46EF-B807-FDD0502418D4}" type="datetimeFigureOut">
               <a:rPr lang="en-US" smtClean="0"/>
-              <a:t>7/5/2025</a:t>
+              <a:t>7/6/2025</a:t>
             </a:fld>
             <a:endParaRPr lang="en-US"/>
           </a:p>
@@ -4348,7 +4350,7 @@
         <p:spPr/>
         <p:txBody>
           <a:bodyPr vert="horz" lIns="91440" tIns="45720" rIns="91440" bIns="45720" rtlCol="0" anchor="t">
-            <a:normAutofit fontScale="92500" lnSpcReduction="10000"/>
+            <a:normAutofit/>
           </a:bodyPr>
           <a:lstStyle/>
           <a:p>
@@ -4366,6 +4368,10 @@
               </a:rPr>
               <a:t>https://archive.ics.uci.edu/dataset/280/higgs</a:t>
             </a:r>
+            <a:endParaRPr lang="en-US">
+              <a:ea typeface="+mn-lt"/>
+              <a:cs typeface="+mn-lt"/>
+            </a:endParaRPr>
           </a:p>
           <a:p>
             <a:r>
@@ -4384,7 +4390,14 @@
           <a:p>
             <a:r>
               <a:rPr lang="en-US" dirty="0"/>
-              <a:t>Without particular hyperparameter tuning, after training, we can get an accuracy of around 75% on the validation dataset</a:t>
+              <a:t>Without particular hyperparameter tuning, after training, we can get an accuracy of around 76% on the validation set and we compute the </a:t>
+            </a:r>
+            <a:r>
+              <a:rPr lang="en-US" dirty="0">
+                <a:ea typeface="+mn-lt"/>
+                <a:cs typeface="+mn-lt"/>
+              </a:rPr>
+              <a:t>area under the ROC curve (AUC) </a:t>
             </a:r>
           </a:p>
           <a:p>
@@ -4401,13 +4414,9 @@
             </a:r>
           </a:p>
           <a:p>
-            <a:r>
-              <a:rPr lang="en-US" dirty="0">
-                <a:ea typeface="+mn-lt"/>
-                <a:cs typeface="+mn-lt"/>
-              </a:rPr>
-              <a:t>Deep learning methods may be able to tackle problems with multiple backgrounds, or lower-level tasks such as identifying the decay products from the high-dimensional raw detector output.</a:t>
-            </a:r>
+            <a:pPr marL="0" indent="0">
+              <a:buNone/>
+            </a:pPr>
             <a:endParaRPr lang="en-US" dirty="0"/>
           </a:p>
         </p:txBody>
@@ -4426,6 +4435,832 @@
 </file>
 
 <file path=ppt/slides/slide17.xml><?xml version="1.0" encoding="utf-8"?>
+<p:sld xmlns:a="http://schemas.openxmlformats.org/drawingml/2006/main" xmlns:r="http://schemas.openxmlformats.org/officeDocument/2006/relationships" xmlns:p="http://schemas.openxmlformats.org/presentationml/2006/main">
+  <p:cSld>
+    <p:spTree>
+      <p:nvGrpSpPr>
+        <p:cNvPr id="1" name="">
+          <a:extLst>
+            <a:ext uri="{FF2B5EF4-FFF2-40B4-BE49-F238E27FC236}">
+              <a16:creationId xmlns:a16="http://schemas.microsoft.com/office/drawing/2014/main" id="{E75437CC-DD91-4112-BD45-E0579E37B41F}"/>
+            </a:ext>
+          </a:extLst>
+        </p:cNvPr>
+        <p:cNvGrpSpPr/>
+        <p:nvPr/>
+      </p:nvGrpSpPr>
+      <p:grpSpPr>
+        <a:xfrm>
+          <a:off x="0" y="0"/>
+          <a:ext cx="0" cy="0"/>
+          <a:chOff x="0" y="0"/>
+          <a:chExt cx="0" cy="0"/>
+        </a:xfrm>
+      </p:grpSpPr>
+      <p:sp>
+        <p:nvSpPr>
+          <p:cNvPr id="2" name="Title 1">
+            <a:extLst>
+              <a:ext uri="{FF2B5EF4-FFF2-40B4-BE49-F238E27FC236}">
+                <a16:creationId xmlns:a16="http://schemas.microsoft.com/office/drawing/2014/main" id="{268CCDB1-FBE9-FF2A-445B-7A09A702C2B2}"/>
+              </a:ext>
+            </a:extLst>
+          </p:cNvPr>
+          <p:cNvSpPr>
+            <a:spLocks noGrp="1"/>
+          </p:cNvSpPr>
+          <p:nvPr>
+            <p:ph type="title"/>
+          </p:nvPr>
+        </p:nvSpPr>
+        <p:spPr/>
+        <p:txBody>
+          <a:bodyPr>
+            <a:normAutofit/>
+          </a:bodyPr>
+          <a:lstStyle/>
+          <a:p>
+            <a:r>
+              <a:rPr lang="en-US" dirty="0"/>
+              <a:t>Threshold for binary classifier</a:t>
+            </a:r>
+          </a:p>
+        </p:txBody>
+      </p:sp>
+      <p:sp>
+        <p:nvSpPr>
+          <p:cNvPr id="4" name="Content Placeholder 3">
+            <a:extLst>
+              <a:ext uri="{FF2B5EF4-FFF2-40B4-BE49-F238E27FC236}">
+                <a16:creationId xmlns:a16="http://schemas.microsoft.com/office/drawing/2014/main" id="{98C7C446-0EFF-A1E7-E398-F7E65A2F91C1}"/>
+              </a:ext>
+            </a:extLst>
+          </p:cNvPr>
+          <p:cNvSpPr>
+            <a:spLocks noGrp="1"/>
+          </p:cNvSpPr>
+          <p:nvPr>
+            <p:ph idx="1"/>
+          </p:nvPr>
+        </p:nvSpPr>
+        <p:spPr/>
+        <p:txBody>
+          <a:bodyPr vert="horz" lIns="91440" tIns="45720" rIns="91440" bIns="45720" rtlCol="0" anchor="t">
+            <a:normAutofit fontScale="92500" lnSpcReduction="20000"/>
+          </a:bodyPr>
+          <a:lstStyle/>
+          <a:p>
+            <a:r>
+              <a:rPr lang="en-US" dirty="0">
+                <a:ea typeface="+mn-lt"/>
+                <a:cs typeface="+mn-lt"/>
+              </a:rPr>
+              <a:t>When we are predicting the probability of an instance belonging to a particular class, a threshold determines at what probability you classify an instance as the positive class (1) or the negative class (0).</a:t>
+            </a:r>
+            <a:endParaRPr lang="en-US"/>
+          </a:p>
+          <a:p>
+            <a:r>
+              <a:rPr lang="en-US" dirty="0">
+                <a:ea typeface="+mn-lt"/>
+                <a:cs typeface="+mn-lt"/>
+              </a:rPr>
+              <a:t>The Higgs classifier decides whether an event involves the Higgs boson or the background. The model computes a score (probability) for each event, representing the likelihood it's a Higgs.</a:t>
+            </a:r>
+            <a:endParaRPr lang="en-US" dirty="0"/>
+          </a:p>
+          <a:p>
+            <a:r>
+              <a:rPr lang="en-US" dirty="0">
+                <a:ea typeface="+mn-lt"/>
+                <a:cs typeface="+mn-lt"/>
+              </a:rPr>
+              <a:t>If we set </a:t>
+            </a:r>
+            <a:r>
+              <a:rPr lang="en-US" b="1" i="1" dirty="0">
+                <a:ea typeface="+mn-lt"/>
+                <a:cs typeface="+mn-lt"/>
+              </a:rPr>
+              <a:t>a high threshold</a:t>
+            </a:r>
+            <a:r>
+              <a:rPr lang="en-US" dirty="0">
+                <a:ea typeface="+mn-lt"/>
+                <a:cs typeface="+mn-lt"/>
+              </a:rPr>
+              <a:t>, the model will only mark very obvious Higgs events, ensuring background events are not accidentally confused as Higgs events. This might mean some less-obvious Higgs events be classified as background.</a:t>
+            </a:r>
+            <a:endParaRPr lang="en-US" dirty="0"/>
+          </a:p>
+          <a:p>
+            <a:r>
+              <a:rPr lang="en-US" dirty="0">
+                <a:ea typeface="+mn-lt"/>
+                <a:cs typeface="+mn-lt"/>
+              </a:rPr>
+              <a:t>On the other hand, if you set a </a:t>
+            </a:r>
+            <a:r>
+              <a:rPr lang="en-US" b="1" i="1" dirty="0">
+                <a:ea typeface="+mn-lt"/>
+                <a:cs typeface="+mn-lt"/>
+              </a:rPr>
+              <a:t>lower threshold</a:t>
+            </a:r>
+            <a:r>
+              <a:rPr lang="en-US" dirty="0">
+                <a:ea typeface="+mn-lt"/>
+                <a:cs typeface="+mn-lt"/>
+              </a:rPr>
+              <a:t>, the filter will catch a broader range of Higgs event, but there's also a higher chance it might incorrectly classify a background event as Higgs.</a:t>
+            </a:r>
+            <a:endParaRPr lang="en-US" dirty="0"/>
+          </a:p>
+          <a:p>
+            <a:endParaRPr lang="en-US" dirty="0"/>
+          </a:p>
+        </p:txBody>
+      </p:sp>
+    </p:spTree>
+    <p:extLst>
+      <p:ext uri="{BB962C8B-B14F-4D97-AF65-F5344CB8AC3E}">
+        <p14:creationId xmlns:p14="http://schemas.microsoft.com/office/powerpoint/2010/main" val="1277279737"/>
+      </p:ext>
+    </p:extLst>
+  </p:cSld>
+  <p:clrMapOvr>
+    <a:masterClrMapping/>
+  </p:clrMapOvr>
+</p:sld>
+</file>
+
+<file path=ppt/slides/slide18.xml><?xml version="1.0" encoding="utf-8"?>
+<p:sld xmlns:a="http://schemas.openxmlformats.org/drawingml/2006/main" xmlns:r="http://schemas.openxmlformats.org/officeDocument/2006/relationships" xmlns:p="http://schemas.openxmlformats.org/presentationml/2006/main">
+  <p:cSld>
+    <p:spTree>
+      <p:nvGrpSpPr>
+        <p:cNvPr id="1" name="">
+          <a:extLst>
+            <a:ext uri="{FF2B5EF4-FFF2-40B4-BE49-F238E27FC236}">
+              <a16:creationId xmlns:a16="http://schemas.microsoft.com/office/drawing/2014/main" id="{E497149A-F8BA-9089-13FD-C6D041AB04AB}"/>
+            </a:ext>
+          </a:extLst>
+        </p:cNvPr>
+        <p:cNvGrpSpPr/>
+        <p:nvPr/>
+      </p:nvGrpSpPr>
+      <p:grpSpPr>
+        <a:xfrm>
+          <a:off x="0" y="0"/>
+          <a:ext cx="0" cy="0"/>
+          <a:chOff x="0" y="0"/>
+          <a:chExt cx="0" cy="0"/>
+        </a:xfrm>
+      </p:grpSpPr>
+      <p:sp>
+        <p:nvSpPr>
+          <p:cNvPr id="2" name="Title 1">
+            <a:extLst>
+              <a:ext uri="{FF2B5EF4-FFF2-40B4-BE49-F238E27FC236}">
+                <a16:creationId xmlns:a16="http://schemas.microsoft.com/office/drawing/2014/main" id="{5CBF6581-7819-C4C7-ACA2-5A664E5786F5}"/>
+              </a:ext>
+            </a:extLst>
+          </p:cNvPr>
+          <p:cNvSpPr>
+            <a:spLocks noGrp="1"/>
+          </p:cNvSpPr>
+          <p:nvPr>
+            <p:ph type="title"/>
+          </p:nvPr>
+        </p:nvSpPr>
+        <p:spPr/>
+        <p:txBody>
+          <a:bodyPr>
+            <a:normAutofit/>
+          </a:bodyPr>
+          <a:lstStyle/>
+          <a:p>
+            <a:r>
+              <a:rPr lang="en-US" dirty="0">
+                <a:ea typeface="+mj-lt"/>
+                <a:cs typeface="+mj-lt"/>
+              </a:rPr>
+              <a:t>ROC</a:t>
+            </a:r>
+            <a:endParaRPr lang="en-US" dirty="0"/>
+          </a:p>
+        </p:txBody>
+      </p:sp>
+      <p:sp>
+        <p:nvSpPr>
+          <p:cNvPr id="4" name="Content Placeholder 3">
+            <a:extLst>
+              <a:ext uri="{FF2B5EF4-FFF2-40B4-BE49-F238E27FC236}">
+                <a16:creationId xmlns:a16="http://schemas.microsoft.com/office/drawing/2014/main" id="{2915B68E-EE3F-16DC-E2BC-0605782F6D0F}"/>
+              </a:ext>
+            </a:extLst>
+          </p:cNvPr>
+          <p:cNvSpPr>
+            <a:spLocks noGrp="1"/>
+          </p:cNvSpPr>
+          <p:nvPr>
+            <p:ph idx="1"/>
+          </p:nvPr>
+        </p:nvSpPr>
+        <p:spPr>
+          <a:xfrm>
+            <a:off x="838200" y="1825625"/>
+            <a:ext cx="10515600" cy="4351338"/>
+          </a:xfrm>
+        </p:spPr>
+        <p:txBody>
+          <a:bodyPr vert="horz" lIns="91440" tIns="45720" rIns="91440" bIns="45720" rtlCol="0" anchor="t">
+            <a:normAutofit/>
+          </a:bodyPr>
+          <a:lstStyle/>
+          <a:p>
+            <a:r>
+              <a:rPr lang="en-US" dirty="0">
+                <a:ea typeface="+mn-lt"/>
+                <a:cs typeface="+mn-lt"/>
+              </a:rPr>
+              <a:t>A </a:t>
+            </a:r>
+            <a:r>
+              <a:rPr lang="en-US" b="1" dirty="0">
+                <a:ea typeface="+mn-lt"/>
+                <a:cs typeface="+mn-lt"/>
+              </a:rPr>
+              <a:t>ROC curve</a:t>
+            </a:r>
+            <a:r>
+              <a:rPr lang="en-US" dirty="0">
+                <a:ea typeface="+mn-lt"/>
+                <a:cs typeface="+mn-lt"/>
+              </a:rPr>
+              <a:t> is a graphical plot </a:t>
+            </a:r>
+            <a:br>
+              <a:rPr lang="en-US" dirty="0">
+                <a:ea typeface="+mn-lt"/>
+                <a:cs typeface="+mn-lt"/>
+              </a:rPr>
+            </a:br>
+            <a:r>
+              <a:rPr lang="en-US" dirty="0">
+                <a:ea typeface="+mn-lt"/>
+                <a:cs typeface="+mn-lt"/>
+              </a:rPr>
+              <a:t>that illustrates the performance</a:t>
+            </a:r>
+            <a:br>
+              <a:rPr lang="en-US" dirty="0">
+                <a:ea typeface="+mn-lt"/>
+                <a:cs typeface="+mn-lt"/>
+              </a:rPr>
+            </a:br>
+            <a:r>
+              <a:rPr lang="en-US" dirty="0">
+                <a:ea typeface="+mn-lt"/>
+                <a:cs typeface="+mn-lt"/>
+              </a:rPr>
+              <a:t>of a binary classifier model </a:t>
+            </a:r>
+            <a:br>
+              <a:rPr lang="en-US" dirty="0">
+                <a:ea typeface="+mn-lt"/>
+                <a:cs typeface="+mn-lt"/>
+              </a:rPr>
+            </a:br>
+            <a:r>
+              <a:rPr lang="en-US" dirty="0">
+                <a:ea typeface="+mn-lt"/>
+                <a:cs typeface="+mn-lt"/>
+              </a:rPr>
+              <a:t>at varying threshold values.</a:t>
+            </a:r>
+            <a:endParaRPr lang="en-US" dirty="0"/>
+          </a:p>
+          <a:p>
+            <a:endParaRPr lang="en-US"/>
+          </a:p>
+          <a:p>
+            <a:endParaRPr lang="en-US" dirty="0">
+              <a:ea typeface="+mn-lt"/>
+              <a:cs typeface="+mn-lt"/>
+            </a:endParaRPr>
+          </a:p>
+          <a:p>
+            <a:endParaRPr lang="en-US" dirty="0">
+              <a:ea typeface="+mn-lt"/>
+              <a:cs typeface="+mn-lt"/>
+            </a:endParaRPr>
+          </a:p>
+          <a:p>
+            <a:r>
+              <a:rPr lang="en-US" dirty="0">
+                <a:ea typeface="+mn-lt"/>
+                <a:cs typeface="+mn-lt"/>
+              </a:rPr>
+              <a:t>The ROC curve is the plot of the true positive rate (TPR) against the false positive rate (FPR) at each threshold setting.</a:t>
+            </a:r>
+            <a:endParaRPr lang="en-US" dirty="0"/>
+          </a:p>
+          <a:p>
+            <a:endParaRPr lang="en-US"/>
+          </a:p>
+        </p:txBody>
+      </p:sp>
+      <p:pic>
+        <p:nvPicPr>
+          <p:cNvPr id="3" name="Picture 2" descr="A graph of a curve&#10;&#10;AI-generated content may be incorrect.">
+            <a:extLst>
+              <a:ext uri="{FF2B5EF4-FFF2-40B4-BE49-F238E27FC236}">
+                <a16:creationId xmlns:a16="http://schemas.microsoft.com/office/drawing/2014/main" id="{459D6EDA-196B-D2E5-DEB8-D15D1BAF8221}"/>
+              </a:ext>
+            </a:extLst>
+          </p:cNvPr>
+          <p:cNvPicPr>
+            <a:picLocks noChangeAspect="1"/>
+          </p:cNvPicPr>
+          <p:nvPr/>
+        </p:nvPicPr>
+        <p:blipFill>
+          <a:blip r:embed="rId2"/>
+          <a:srcRect l="-102" t="3571" r="3282"/>
+          <a:stretch>
+            <a:fillRect/>
+          </a:stretch>
+        </p:blipFill>
+        <p:spPr>
+          <a:xfrm>
+            <a:off x="6106160" y="1685925"/>
+            <a:ext cx="5099859" cy="3468324"/>
+          </a:xfrm>
+          <a:prstGeom prst="rect">
+            <a:avLst/>
+          </a:prstGeom>
+        </p:spPr>
+      </p:pic>
+    </p:spTree>
+    <p:extLst>
+      <p:ext uri="{BB962C8B-B14F-4D97-AF65-F5344CB8AC3E}">
+        <p14:creationId xmlns:p14="http://schemas.microsoft.com/office/powerpoint/2010/main" val="1975279200"/>
+      </p:ext>
+    </p:extLst>
+  </p:cSld>
+  <p:clrMapOvr>
+    <a:masterClrMapping/>
+  </p:clrMapOvr>
+</p:sld>
+</file>
+
+<file path=ppt/slides/slide19.xml><?xml version="1.0" encoding="utf-8"?>
+<p:sld xmlns:a="http://schemas.openxmlformats.org/drawingml/2006/main" xmlns:r="http://schemas.openxmlformats.org/officeDocument/2006/relationships" xmlns:p="http://schemas.openxmlformats.org/presentationml/2006/main">
+  <p:cSld>
+    <p:spTree>
+      <p:nvGrpSpPr>
+        <p:cNvPr id="1" name="">
+          <a:extLst>
+            <a:ext uri="{FF2B5EF4-FFF2-40B4-BE49-F238E27FC236}">
+              <a16:creationId xmlns:a16="http://schemas.microsoft.com/office/drawing/2014/main" id="{8A4322B0-9379-01D3-4289-B02D7099BEE2}"/>
+            </a:ext>
+          </a:extLst>
+        </p:cNvPr>
+        <p:cNvGrpSpPr/>
+        <p:nvPr/>
+      </p:nvGrpSpPr>
+      <p:grpSpPr>
+        <a:xfrm>
+          <a:off x="0" y="0"/>
+          <a:ext cx="0" cy="0"/>
+          <a:chOff x="0" y="0"/>
+          <a:chExt cx="0" cy="0"/>
+        </a:xfrm>
+      </p:grpSpPr>
+      <p:sp>
+        <p:nvSpPr>
+          <p:cNvPr id="2" name="Title 1">
+            <a:extLst>
+              <a:ext uri="{FF2B5EF4-FFF2-40B4-BE49-F238E27FC236}">
+                <a16:creationId xmlns:a16="http://schemas.microsoft.com/office/drawing/2014/main" id="{7212095C-9747-F76A-1191-0ED5564AA6E4}"/>
+              </a:ext>
+            </a:extLst>
+          </p:cNvPr>
+          <p:cNvSpPr>
+            <a:spLocks noGrp="1"/>
+          </p:cNvSpPr>
+          <p:nvPr>
+            <p:ph type="title"/>
+          </p:nvPr>
+        </p:nvSpPr>
+        <p:spPr/>
+        <p:txBody>
+          <a:bodyPr>
+            <a:normAutofit/>
+          </a:bodyPr>
+          <a:lstStyle/>
+          <a:p>
+            <a:r>
+              <a:rPr lang="en-US" dirty="0">
+                <a:ea typeface="+mj-lt"/>
+                <a:cs typeface="+mj-lt"/>
+              </a:rPr>
+              <a:t>AUC</a:t>
+            </a:r>
+            <a:endParaRPr lang="en-US" dirty="0"/>
+          </a:p>
+        </p:txBody>
+      </p:sp>
+      <p:sp>
+        <p:nvSpPr>
+          <p:cNvPr id="4" name="Content Placeholder 3">
+            <a:extLst>
+              <a:ext uri="{FF2B5EF4-FFF2-40B4-BE49-F238E27FC236}">
+                <a16:creationId xmlns:a16="http://schemas.microsoft.com/office/drawing/2014/main" id="{A1892508-8A87-FCDC-AAF0-9DB44BDFB7A7}"/>
+              </a:ext>
+            </a:extLst>
+          </p:cNvPr>
+          <p:cNvSpPr>
+            <a:spLocks noGrp="1"/>
+          </p:cNvSpPr>
+          <p:nvPr>
+            <p:ph idx="1"/>
+          </p:nvPr>
+        </p:nvSpPr>
+        <p:spPr/>
+        <p:txBody>
+          <a:bodyPr vert="horz" lIns="91440" tIns="45720" rIns="91440" bIns="45720" rtlCol="0" anchor="t">
+            <a:normAutofit/>
+          </a:bodyPr>
+          <a:lstStyle/>
+          <a:p>
+            <a:r>
+              <a:rPr lang="en-US" dirty="0">
+                <a:ea typeface="+mn-lt"/>
+                <a:cs typeface="+mn-lt"/>
+              </a:rPr>
+              <a:t>The Area Under the ROC Curve (AUC) is a metric used to evaluate the performance of a binary classification model. </a:t>
+            </a:r>
+          </a:p>
+          <a:p>
+            <a:r>
+              <a:rPr lang="en-US" dirty="0">
+                <a:ea typeface="+mn-lt"/>
+                <a:cs typeface="+mn-lt"/>
+              </a:rPr>
+              <a:t>An AUC of 1.0 indicates a perfect model, while an AUC of 0.5 suggests the model performs no better than random guessing</a:t>
+            </a:r>
+            <a:endParaRPr lang="en-US" dirty="0"/>
+          </a:p>
+          <a:p>
+            <a:pPr lvl="1"/>
+            <a:r>
+              <a:rPr lang="en-US" b="1" dirty="0">
+                <a:ea typeface="+mn-lt"/>
+                <a:cs typeface="+mn-lt"/>
+              </a:rPr>
+              <a:t>0.5:</a:t>
+            </a:r>
+            <a:r>
+              <a:rPr lang="en-US" dirty="0">
+                <a:ea typeface="+mn-lt"/>
+                <a:cs typeface="+mn-lt"/>
+              </a:rPr>
+              <a:t> No discriminatory power (random guessing). </a:t>
+            </a:r>
+            <a:endParaRPr lang="en-US"/>
+          </a:p>
+          <a:p>
+            <a:pPr lvl="1"/>
+            <a:r>
+              <a:rPr lang="en-US" b="1" dirty="0">
+                <a:ea typeface="+mn-lt"/>
+                <a:cs typeface="+mn-lt"/>
+              </a:rPr>
+              <a:t>0.7 - 0.8:</a:t>
+            </a:r>
+            <a:r>
+              <a:rPr lang="en-US" dirty="0">
+                <a:ea typeface="+mn-lt"/>
+                <a:cs typeface="+mn-lt"/>
+              </a:rPr>
+              <a:t> Acceptable performance. </a:t>
+            </a:r>
+            <a:endParaRPr lang="en-US" dirty="0"/>
+          </a:p>
+          <a:p>
+            <a:pPr lvl="1"/>
+            <a:r>
+              <a:rPr lang="en-US" b="1" dirty="0">
+                <a:ea typeface="+mn-lt"/>
+                <a:cs typeface="+mn-lt"/>
+              </a:rPr>
+              <a:t>0.8 - 0.9:</a:t>
+            </a:r>
+            <a:r>
+              <a:rPr lang="en-US" dirty="0">
+                <a:ea typeface="+mn-lt"/>
+                <a:cs typeface="+mn-lt"/>
+              </a:rPr>
+              <a:t> Excellent performance. </a:t>
+            </a:r>
+            <a:endParaRPr lang="en-US"/>
+          </a:p>
+          <a:p>
+            <a:pPr lvl="1"/>
+            <a:r>
+              <a:rPr lang="en-US" b="1" dirty="0">
+                <a:ea typeface="+mn-lt"/>
+                <a:cs typeface="+mn-lt"/>
+              </a:rPr>
+              <a:t>0.9 - 1.0:</a:t>
+            </a:r>
+            <a:r>
+              <a:rPr lang="en-US" dirty="0">
+                <a:ea typeface="+mn-lt"/>
+                <a:cs typeface="+mn-lt"/>
+              </a:rPr>
+              <a:t> Outstanding performance. </a:t>
+            </a:r>
+            <a:endParaRPr lang="en-US" dirty="0"/>
+          </a:p>
+          <a:p>
+            <a:endParaRPr lang="en-US" dirty="0"/>
+          </a:p>
+          <a:p>
+            <a:endParaRPr lang="en-US" dirty="0"/>
+          </a:p>
+        </p:txBody>
+      </p:sp>
+    </p:spTree>
+    <p:extLst>
+      <p:ext uri="{BB962C8B-B14F-4D97-AF65-F5344CB8AC3E}">
+        <p14:creationId xmlns:p14="http://schemas.microsoft.com/office/powerpoint/2010/main" val="522451010"/>
+      </p:ext>
+    </p:extLst>
+  </p:cSld>
+  <p:clrMapOvr>
+    <a:masterClrMapping/>
+  </p:clrMapOvr>
+</p:sld>
+</file>
+
+<file path=ppt/slides/slide2.xml><?xml version="1.0" encoding="utf-8"?>
+<p:sld xmlns:a="http://schemas.openxmlformats.org/drawingml/2006/main" xmlns:r="http://schemas.openxmlformats.org/officeDocument/2006/relationships" xmlns:p="http://schemas.openxmlformats.org/presentationml/2006/main">
+  <p:cSld>
+    <p:spTree>
+      <p:nvGrpSpPr>
+        <p:cNvPr id="1" name=""/>
+        <p:cNvGrpSpPr/>
+        <p:nvPr/>
+      </p:nvGrpSpPr>
+      <p:grpSpPr>
+        <a:xfrm>
+          <a:off x="0" y="0"/>
+          <a:ext cx="0" cy="0"/>
+          <a:chOff x="0" y="0"/>
+          <a:chExt cx="0" cy="0"/>
+        </a:xfrm>
+      </p:grpSpPr>
+      <p:sp>
+        <p:nvSpPr>
+          <p:cNvPr id="2" name="Title 1">
+            <a:extLst>
+              <a:ext uri="{FF2B5EF4-FFF2-40B4-BE49-F238E27FC236}">
+                <a16:creationId xmlns:a16="http://schemas.microsoft.com/office/drawing/2014/main" id="{7E8C8F0A-3DC8-D1EA-1794-F003AC4CAA6F}"/>
+              </a:ext>
+            </a:extLst>
+          </p:cNvPr>
+          <p:cNvSpPr>
+            <a:spLocks noGrp="1"/>
+          </p:cNvSpPr>
+          <p:nvPr>
+            <p:ph type="title"/>
+          </p:nvPr>
+        </p:nvSpPr>
+        <p:spPr/>
+        <p:txBody>
+          <a:bodyPr>
+            <a:normAutofit/>
+          </a:bodyPr>
+          <a:lstStyle/>
+          <a:p>
+            <a:r>
+              <a:rPr lang="en-US" dirty="0">
+                <a:latin typeface="Aptos"/>
+              </a:rPr>
+              <a:t>Exploratory data analysis (EDA)</a:t>
+            </a:r>
+          </a:p>
+        </p:txBody>
+      </p:sp>
+      <p:sp>
+        <p:nvSpPr>
+          <p:cNvPr id="3" name="Content Placeholder 2">
+            <a:extLst>
+              <a:ext uri="{FF2B5EF4-FFF2-40B4-BE49-F238E27FC236}">
+                <a16:creationId xmlns:a16="http://schemas.microsoft.com/office/drawing/2014/main" id="{F33AAB21-0DEE-F27D-8863-CB061DF74378}"/>
+              </a:ext>
+            </a:extLst>
+          </p:cNvPr>
+          <p:cNvSpPr>
+            <a:spLocks noGrp="1"/>
+          </p:cNvSpPr>
+          <p:nvPr>
+            <p:ph idx="1"/>
+          </p:nvPr>
+        </p:nvSpPr>
+        <p:spPr/>
+        <p:txBody>
+          <a:bodyPr vert="horz" lIns="91440" tIns="45720" rIns="91440" bIns="45720" rtlCol="0" anchor="t">
+            <a:normAutofit/>
+          </a:bodyPr>
+          <a:lstStyle/>
+          <a:p>
+            <a:r>
+              <a:rPr lang="en-US" dirty="0"/>
+              <a:t>EDA</a:t>
+            </a:r>
+            <a:r>
+              <a:rPr lang="en-US" dirty="0">
+                <a:ea typeface="+mn-lt"/>
+                <a:cs typeface="+mn-lt"/>
+              </a:rPr>
+              <a:t> is used for</a:t>
+            </a:r>
+            <a:r>
+              <a:rPr lang="en-US" sz="2800" dirty="0">
+                <a:ea typeface="+mn-lt"/>
+                <a:cs typeface="+mn-lt"/>
+              </a:rPr>
+              <a:t> </a:t>
+            </a:r>
+            <a:r>
+              <a:rPr lang="en-US" dirty="0">
+                <a:ea typeface="+mn-lt"/>
+                <a:cs typeface="+mn-lt"/>
+              </a:rPr>
+              <a:t>analyzing datasets and summarizing their main characteristics</a:t>
+            </a:r>
+            <a:r>
+              <a:rPr lang="en-US" sz="2800" dirty="0">
+                <a:ea typeface="+mn-lt"/>
+                <a:cs typeface="+mn-lt"/>
+              </a:rPr>
+              <a:t>, </a:t>
+            </a:r>
+            <a:r>
+              <a:rPr lang="en-US" dirty="0">
+                <a:ea typeface="+mn-lt"/>
+                <a:cs typeface="+mn-lt"/>
+              </a:rPr>
+              <a:t>using statistical graphics or visualization methods</a:t>
+            </a:r>
+            <a:endParaRPr lang="en-US" dirty="0"/>
+          </a:p>
+          <a:p>
+            <a:r>
+              <a:rPr lang="en-US" dirty="0">
+                <a:ea typeface="+mn-lt"/>
+                <a:cs typeface="+mn-lt"/>
+              </a:rPr>
+              <a:t>EDA is for seeing what the data can tell</a:t>
+            </a:r>
+          </a:p>
+          <a:p>
+            <a:r>
+              <a:rPr lang="en-US" dirty="0"/>
+              <a:t>In the USA, and West Coast in particular,</a:t>
+            </a:r>
+            <a:br>
+              <a:rPr lang="en-US" dirty="0"/>
+            </a:br>
+            <a:r>
+              <a:rPr lang="en-US" dirty="0"/>
+              <a:t>people argue</a:t>
+            </a:r>
+            <a:r>
+              <a:rPr lang="en-US" dirty="0">
+                <a:ea typeface="+mn-lt"/>
+                <a:cs typeface="+mn-lt"/>
+              </a:rPr>
+              <a:t> about who has most rain</a:t>
+            </a:r>
+          </a:p>
+          <a:p>
+            <a:r>
+              <a:rPr lang="en-US" dirty="0">
+                <a:ea typeface="+mn-lt"/>
+                <a:cs typeface="+mn-lt"/>
+              </a:rPr>
+              <a:t>What about the East Coast?</a:t>
+            </a:r>
+            <a:br>
+              <a:rPr lang="en-US" dirty="0">
+                <a:ea typeface="+mn-lt"/>
+                <a:cs typeface="+mn-lt"/>
+              </a:rPr>
+            </a:br>
+            <a:r>
+              <a:rPr lang="en-US" dirty="0">
+                <a:ea typeface="+mn-lt"/>
+                <a:cs typeface="+mn-lt"/>
+              </a:rPr>
+              <a:t>We want to see if it rains more </a:t>
+            </a:r>
+            <a:br>
+              <a:rPr lang="en-US" dirty="0">
+                <a:ea typeface="+mn-lt"/>
+                <a:cs typeface="+mn-lt"/>
+              </a:rPr>
+            </a:br>
+            <a:r>
+              <a:rPr lang="en-US" dirty="0">
+                <a:ea typeface="+mn-lt"/>
+                <a:cs typeface="+mn-lt"/>
+              </a:rPr>
+              <a:t>in Atlanta or Seattle</a:t>
+            </a:r>
+          </a:p>
+        </p:txBody>
+      </p:sp>
+      <p:pic>
+        <p:nvPicPr>
+          <p:cNvPr id="4" name="Picture 3" descr="A screenshot of a weather forecast&#10;&#10;AI-generated content may be incorrect.">
+            <a:extLst>
+              <a:ext uri="{FF2B5EF4-FFF2-40B4-BE49-F238E27FC236}">
+                <a16:creationId xmlns:a16="http://schemas.microsoft.com/office/drawing/2014/main" id="{33ECEA8B-4D30-7127-9BB2-6BFCDED318D3}"/>
+              </a:ext>
+            </a:extLst>
+          </p:cNvPr>
+          <p:cNvPicPr>
+            <a:picLocks noChangeAspect="1"/>
+          </p:cNvPicPr>
+          <p:nvPr/>
+        </p:nvPicPr>
+        <p:blipFill>
+          <a:blip r:embed="rId2"/>
+          <a:stretch>
+            <a:fillRect/>
+          </a:stretch>
+        </p:blipFill>
+        <p:spPr>
+          <a:xfrm>
+            <a:off x="7546122" y="2709487"/>
+            <a:ext cx="3810684" cy="3151268"/>
+          </a:xfrm>
+          <a:prstGeom prst="rect">
+            <a:avLst/>
+          </a:prstGeom>
+        </p:spPr>
+      </p:pic>
+      <p:pic>
+        <p:nvPicPr>
+          <p:cNvPr id="6" name="Picture 5" descr="A map of the united states&#10;&#10;AI-generated content may be incorrect.">
+            <a:extLst>
+              <a:ext uri="{FF2B5EF4-FFF2-40B4-BE49-F238E27FC236}">
+                <a16:creationId xmlns:a16="http://schemas.microsoft.com/office/drawing/2014/main" id="{151552C3-2F85-BE3E-E6D1-35C7CBBEF892}"/>
+              </a:ext>
+            </a:extLst>
+          </p:cNvPr>
+          <p:cNvPicPr>
+            <a:picLocks noChangeAspect="1"/>
+          </p:cNvPicPr>
+          <p:nvPr/>
+        </p:nvPicPr>
+        <p:blipFill>
+          <a:blip r:embed="rId3"/>
+          <a:srcRect l="-510" t="-72" r="36905" b="14272"/>
+          <a:stretch>
+            <a:fillRect/>
+          </a:stretch>
+        </p:blipFill>
+        <p:spPr>
+          <a:xfrm>
+            <a:off x="5717162" y="3996246"/>
+            <a:ext cx="2813761" cy="2176400"/>
+          </a:xfrm>
+          <a:prstGeom prst="rect">
+            <a:avLst/>
+          </a:prstGeom>
+        </p:spPr>
+      </p:pic>
+    </p:spTree>
+    <p:extLst>
+      <p:ext uri="{BB962C8B-B14F-4D97-AF65-F5344CB8AC3E}">
+        <p14:creationId xmlns:p14="http://schemas.microsoft.com/office/powerpoint/2010/main" val="3258540556"/>
+      </p:ext>
+    </p:extLst>
+  </p:cSld>
+  <p:clrMapOvr>
+    <a:masterClrMapping/>
+  </p:clrMapOvr>
+</p:sld>
+</file>
+
+<file path=ppt/slides/slide20.xml><?xml version="1.0" encoding="utf-8"?>
 <p:sld xmlns:a="http://schemas.openxmlformats.org/drawingml/2006/main" xmlns:r="http://schemas.openxmlformats.org/officeDocument/2006/relationships" xmlns:p="http://schemas.openxmlformats.org/presentationml/2006/main">
   <p:cSld>
     <p:spTree>
@@ -4589,7 +5424,7 @@
 </p:sld>
 </file>
 
-<file path=ppt/slides/slide18.xml><?xml version="1.0" encoding="utf-8"?>
+<file path=ppt/slides/slide21.xml><?xml version="1.0" encoding="utf-8"?>
 <p:sld xmlns:a="http://schemas.openxmlformats.org/drawingml/2006/main" xmlns:r="http://schemas.openxmlformats.org/officeDocument/2006/relationships" xmlns:p="http://schemas.openxmlformats.org/presentationml/2006/main">
   <p:cSld>
     <p:spTree>
@@ -4746,7 +5581,7 @@
 </p:sld>
 </file>
 
-<file path=ppt/slides/slide19.xml><?xml version="1.0" encoding="utf-8"?>
+<file path=ppt/slides/slide22.xml><?xml version="1.0" encoding="utf-8"?>
 <p:sld xmlns:a="http://schemas.openxmlformats.org/drawingml/2006/main" xmlns:r="http://schemas.openxmlformats.org/officeDocument/2006/relationships" xmlns:p="http://schemas.openxmlformats.org/presentationml/2006/main">
   <p:cSld>
     <p:spTree>
@@ -4897,259 +5732,6 @@
     <p:extLst>
       <p:ext uri="{BB962C8B-B14F-4D97-AF65-F5344CB8AC3E}">
         <p14:creationId xmlns:p14="http://schemas.microsoft.com/office/powerpoint/2010/main" val="3016579628"/>
-      </p:ext>
-    </p:extLst>
-  </p:cSld>
-  <p:clrMapOvr>
-    <a:masterClrMapping/>
-  </p:clrMapOvr>
-</p:sld>
-</file>
-
-<file path=ppt/slides/slide2.xml><?xml version="1.0" encoding="utf-8"?>
-<p:sld xmlns:a="http://schemas.openxmlformats.org/drawingml/2006/main" xmlns:r="http://schemas.openxmlformats.org/officeDocument/2006/relationships" xmlns:p="http://schemas.openxmlformats.org/presentationml/2006/main">
-  <p:cSld>
-    <p:spTree>
-      <p:nvGrpSpPr>
-        <p:cNvPr id="1" name=""/>
-        <p:cNvGrpSpPr/>
-        <p:nvPr/>
-      </p:nvGrpSpPr>
-      <p:grpSpPr>
-        <a:xfrm>
-          <a:off x="0" y="0"/>
-          <a:ext cx="0" cy="0"/>
-          <a:chOff x="0" y="0"/>
-          <a:chExt cx="0" cy="0"/>
-        </a:xfrm>
-      </p:grpSpPr>
-      <p:sp>
-        <p:nvSpPr>
-          <p:cNvPr id="2" name="Title 1">
-            <a:extLst>
-              <a:ext uri="{FF2B5EF4-FFF2-40B4-BE49-F238E27FC236}">
-                <a16:creationId xmlns:a16="http://schemas.microsoft.com/office/drawing/2014/main" id="{7E8C8F0A-3DC8-D1EA-1794-F003AC4CAA6F}"/>
-              </a:ext>
-            </a:extLst>
-          </p:cNvPr>
-          <p:cNvSpPr>
-            <a:spLocks noGrp="1"/>
-          </p:cNvSpPr>
-          <p:nvPr>
-            <p:ph type="title"/>
-          </p:nvPr>
-        </p:nvSpPr>
-        <p:spPr/>
-        <p:txBody>
-          <a:bodyPr>
-            <a:normAutofit/>
-          </a:bodyPr>
-          <a:lstStyle/>
-          <a:p>
-            <a:r>
-              <a:rPr lang="en-US" dirty="0">
-                <a:latin typeface="Aptos"/>
-              </a:rPr>
-              <a:t>Exploratory data analysis (EDA)</a:t>
-            </a:r>
-          </a:p>
-        </p:txBody>
-      </p:sp>
-      <p:sp>
-        <p:nvSpPr>
-          <p:cNvPr id="3" name="Content Placeholder 2">
-            <a:extLst>
-              <a:ext uri="{FF2B5EF4-FFF2-40B4-BE49-F238E27FC236}">
-                <a16:creationId xmlns:a16="http://schemas.microsoft.com/office/drawing/2014/main" id="{F33AAB21-0DEE-F27D-8863-CB061DF74378}"/>
-              </a:ext>
-            </a:extLst>
-          </p:cNvPr>
-          <p:cNvSpPr>
-            <a:spLocks noGrp="1"/>
-          </p:cNvSpPr>
-          <p:nvPr>
-            <p:ph idx="1"/>
-          </p:nvPr>
-        </p:nvSpPr>
-        <p:spPr/>
-        <p:txBody>
-          <a:bodyPr vert="horz" lIns="91440" tIns="45720" rIns="91440" bIns="45720" rtlCol="0" anchor="t">
-            <a:normAutofit/>
-          </a:bodyPr>
-          <a:lstStyle/>
-          <a:p>
-            <a:r>
-              <a:rPr lang="en-US" dirty="0"/>
-              <a:t>EDA</a:t>
-            </a:r>
-            <a:r>
-              <a:rPr lang="en-US" dirty="0">
-                <a:ea typeface="+mn-lt"/>
-                <a:cs typeface="+mn-lt"/>
-              </a:rPr>
-              <a:t> is used for</a:t>
-            </a:r>
-            <a:r>
-              <a:rPr lang="en-US" sz="2800" dirty="0">
-                <a:ea typeface="+mn-lt"/>
-                <a:cs typeface="+mn-lt"/>
-              </a:rPr>
-              <a:t> </a:t>
-            </a:r>
-            <a:r>
-              <a:rPr lang="en-US" dirty="0">
-                <a:ea typeface="+mn-lt"/>
-                <a:cs typeface="+mn-lt"/>
-              </a:rPr>
-              <a:t>analyzing datasets and summarizing their main characteristics</a:t>
-            </a:r>
-            <a:r>
-              <a:rPr lang="en-US" sz="2800" dirty="0">
-                <a:ea typeface="+mn-lt"/>
-                <a:cs typeface="+mn-lt"/>
-              </a:rPr>
-              <a:t>, </a:t>
-            </a:r>
-            <a:r>
-              <a:rPr lang="en-US" dirty="0">
-                <a:ea typeface="+mn-lt"/>
-                <a:cs typeface="+mn-lt"/>
-              </a:rPr>
-              <a:t>using statistical graphics or visualization methods</a:t>
-            </a:r>
-            <a:endParaRPr lang="en-US" dirty="0"/>
-          </a:p>
-          <a:p>
-            <a:r>
-              <a:rPr lang="en-US" dirty="0">
-                <a:ea typeface="+mn-lt"/>
-                <a:cs typeface="+mn-lt"/>
-              </a:rPr>
-              <a:t>EDA is for seeing what the data can tell</a:t>
-            </a:r>
-          </a:p>
-          <a:p>
-            <a:r>
-              <a:rPr lang="en-US" dirty="0"/>
-              <a:t>In the USA, and West Coast in particular,</a:t>
-            </a:r>
-            <a:br>
-              <a:rPr lang="en-US" dirty="0"/>
-            </a:br>
-            <a:r>
-              <a:rPr lang="en-US" dirty="0"/>
-              <a:t>people argue</a:t>
-            </a:r>
-            <a:r>
-              <a:rPr lang="en-US" dirty="0">
-                <a:ea typeface="+mn-lt"/>
-                <a:cs typeface="+mn-lt"/>
-              </a:rPr>
-              <a:t> about who has most rain</a:t>
-            </a:r>
-          </a:p>
-          <a:p>
-            <a:r>
-              <a:rPr lang="en-US" dirty="0">
-                <a:ea typeface="+mn-lt"/>
-                <a:cs typeface="+mn-lt"/>
-              </a:rPr>
-              <a:t>What about the East Coast?</a:t>
-            </a:r>
-            <a:br>
-              <a:rPr lang="en-US" dirty="0">
-                <a:ea typeface="+mn-lt"/>
-                <a:cs typeface="+mn-lt"/>
-              </a:rPr>
-            </a:br>
-            <a:r>
-              <a:rPr lang="en-US" dirty="0">
-                <a:ea typeface="+mn-lt"/>
-                <a:cs typeface="+mn-lt"/>
-              </a:rPr>
-              <a:t>We want to see if it rains more </a:t>
-            </a:r>
-            <a:br>
-              <a:rPr lang="en-US" dirty="0">
-                <a:ea typeface="+mn-lt"/>
-                <a:cs typeface="+mn-lt"/>
-              </a:rPr>
-            </a:br>
-            <a:r>
-              <a:rPr lang="en-US" dirty="0">
-                <a:ea typeface="+mn-lt"/>
-                <a:cs typeface="+mn-lt"/>
-              </a:rPr>
-              <a:t>in Atlanta or Seattle</a:t>
-            </a:r>
-          </a:p>
-        </p:txBody>
-      </p:sp>
-      <p:pic>
-        <p:nvPicPr>
-          <p:cNvPr id="4" name="Picture 3" descr="A screenshot of a weather forecast&#10;&#10;AI-generated content may be incorrect.">
-            <a:extLst>
-              <a:ext uri="{FF2B5EF4-FFF2-40B4-BE49-F238E27FC236}">
-                <a16:creationId xmlns:a16="http://schemas.microsoft.com/office/drawing/2014/main" id="{33ECEA8B-4D30-7127-9BB2-6BFCDED318D3}"/>
-              </a:ext>
-            </a:extLst>
-          </p:cNvPr>
-          <p:cNvPicPr>
-            <a:picLocks noChangeAspect="1"/>
-          </p:cNvPicPr>
-          <p:nvPr/>
-        </p:nvPicPr>
-        <p:blipFill>
-          <a:blip r:embed="rId2"/>
-          <a:stretch>
-            <a:fillRect/>
-          </a:stretch>
-        </p:blipFill>
-        <p:spPr>
-          <a:xfrm>
-            <a:off x="7546122" y="2709487"/>
-            <a:ext cx="3810684" cy="3151268"/>
-          </a:xfrm>
-          <a:prstGeom prst="rect">
-            <a:avLst/>
-          </a:prstGeom>
-        </p:spPr>
-      </p:pic>
-      <p:pic>
-        <p:nvPicPr>
-          <p:cNvPr id="6" name="Picture 5" descr="A map of the united states&#10;&#10;AI-generated content may be incorrect.">
-            <a:extLst>
-              <a:ext uri="{FF2B5EF4-FFF2-40B4-BE49-F238E27FC236}">
-                <a16:creationId xmlns:a16="http://schemas.microsoft.com/office/drawing/2014/main" id="{151552C3-2F85-BE3E-E6D1-35C7CBBEF892}"/>
-              </a:ext>
-            </a:extLst>
-          </p:cNvPr>
-          <p:cNvPicPr>
-            <a:picLocks noChangeAspect="1"/>
-          </p:cNvPicPr>
-          <p:nvPr/>
-        </p:nvPicPr>
-        <p:blipFill>
-          <a:blip r:embed="rId3"/>
-          <a:srcRect l="-510" t="-72" r="36905" b="14272"/>
-          <a:stretch>
-            <a:fillRect/>
-          </a:stretch>
-        </p:blipFill>
-        <p:spPr>
-          <a:xfrm>
-            <a:off x="5717162" y="3996246"/>
-            <a:ext cx="2813761" cy="2176400"/>
-          </a:xfrm>
-          <a:prstGeom prst="rect">
-            <a:avLst/>
-          </a:prstGeom>
-        </p:spPr>
-      </p:pic>
-    </p:spTree>
-    <p:extLst>
-      <p:ext uri="{BB962C8B-B14F-4D97-AF65-F5344CB8AC3E}">
-        <p14:creationId xmlns:p14="http://schemas.microsoft.com/office/powerpoint/2010/main" val="3258540556"/>
       </p:ext>
     </p:extLst>
   </p:cSld>

</xml_diff>